<commit_message>
update opening slides for March 15
include daily agenda
</commit_message>
<xml_diff>
--- a/PRESENTATIONS/2021-03-online-f2f/2021-03-15-WoT-Opening-McCool.pptx
+++ b/PRESENTATIONS/2021-03-online-f2f/2021-03-15-WoT-Opening-McCool.pptx
@@ -5,12 +5,13 @@
     <p:sldMasterId id="2147483648" r:id="rId1"/>
   </p:sldMasterIdLst>
   <p:notesMasterIdLst>
-    <p:notesMasterId r:id="rId5"/>
+    <p:notesMasterId r:id="rId6"/>
   </p:notesMasterIdLst>
   <p:sldIdLst>
     <p:sldId id="256" r:id="rId2"/>
     <p:sldId id="257" r:id="rId3"/>
-    <p:sldId id="258" r:id="rId4"/>
+    <p:sldId id="259" r:id="rId4"/>
+    <p:sldId id="258" r:id="rId5"/>
   </p:sldIdLst>
   <p:sldSz cx="12192000" cy="6858000"/>
   <p:notesSz cx="6858000" cy="9144000"/>
@@ -4938,6 +4939,261 @@
           <p:cNvPr id="2" name="Title 1">
             <a:extLst>
               <a:ext uri="{FF2B5EF4-FFF2-40B4-BE49-F238E27FC236}">
+                <a16:creationId xmlns:a16="http://schemas.microsoft.com/office/drawing/2014/main" id="{ADDAC1B2-45F8-2948-A27E-D1F00EF6EAE3}"/>
+              </a:ext>
+            </a:extLst>
+          </p:cNvPr>
+          <p:cNvSpPr>
+            <a:spLocks noGrp="1"/>
+          </p:cNvSpPr>
+          <p:nvPr>
+            <p:ph type="title"/>
+          </p:nvPr>
+        </p:nvSpPr>
+        <p:spPr/>
+        <p:txBody>
+          <a:bodyPr/>
+          <a:lstStyle/>
+          <a:p>
+            <a:r>
+              <a:rPr lang="en-CA" b="1" dirty="0"/>
+              <a:t>IG: Monday March 15 (3h)</a:t>
+            </a:r>
+            <a:r>
+              <a:rPr lang="en-CA" dirty="0"/>
+              <a:t> </a:t>
+            </a:r>
+            <a:br>
+              <a:rPr lang="en-CA" dirty="0"/>
+            </a:br>
+            <a:r>
+              <a:rPr lang="en-CA" dirty="0"/>
+              <a:t>Joint Sessions</a:t>
+            </a:r>
+            <a:endParaRPr lang="en-US" dirty="0"/>
+          </a:p>
+        </p:txBody>
+      </p:sp>
+      <p:sp>
+        <p:nvSpPr>
+          <p:cNvPr id="3" name="Content Placeholder 2">
+            <a:extLst>
+              <a:ext uri="{FF2B5EF4-FFF2-40B4-BE49-F238E27FC236}">
+                <a16:creationId xmlns:a16="http://schemas.microsoft.com/office/drawing/2014/main" id="{234FF69C-6A82-BF44-BD7D-518DFA442D5B}"/>
+              </a:ext>
+            </a:extLst>
+          </p:cNvPr>
+          <p:cNvSpPr>
+            <a:spLocks noGrp="1"/>
+          </p:cNvSpPr>
+          <p:nvPr>
+            <p:ph idx="1"/>
+          </p:nvPr>
+        </p:nvSpPr>
+        <p:spPr>
+          <a:xfrm>
+            <a:off x="838200" y="1690688"/>
+            <a:ext cx="10515600" cy="4486275"/>
+          </a:xfrm>
+        </p:spPr>
+        <p:txBody>
+          <a:bodyPr/>
+          <a:lstStyle/>
+          <a:p>
+            <a:r>
+              <a:rPr lang="en-CA" b="1" dirty="0"/>
+              <a:t>Opening session: Welcome (Sebastian/McCool; 5m)</a:t>
+            </a:r>
+          </a:p>
+          <a:p>
+            <a:r>
+              <a:rPr lang="en-CA" b="1" dirty="0"/>
+              <a:t>Joint Sessions (2h50m)</a:t>
+            </a:r>
+            <a:r>
+              <a:rPr lang="en-CA" dirty="0"/>
+              <a:t>[</a:t>
+            </a:r>
+            <a:r>
+              <a:rPr lang="en-CA" dirty="0">
+                <a:hlinkClick r:id="rId2" tooltip="Edit section: Joint Sessions (2h50m)"/>
+              </a:rPr>
+              <a:t>edit</a:t>
+            </a:r>
+            <a:r>
+              <a:rPr lang="en-CA" dirty="0"/>
+              <a:t>]</a:t>
+            </a:r>
+            <a:endParaRPr lang="en-CA" b="1" dirty="0"/>
+          </a:p>
+          <a:p>
+            <a:pPr lvl="1"/>
+            <a:r>
+              <a:rPr lang="en-CA" dirty="0"/>
+              <a:t>WoT Intro (McCool; 20m)</a:t>
+            </a:r>
+          </a:p>
+          <a:p>
+            <a:pPr lvl="1"/>
+            <a:r>
+              <a:rPr lang="en-CA" dirty="0"/>
+              <a:t>IEC CDD/ECLASS - 50m (30m update, 20m discussion)</a:t>
+            </a:r>
+          </a:p>
+          <a:p>
+            <a:pPr lvl="1"/>
+            <a:r>
+              <a:rPr lang="en-CA" dirty="0" err="1"/>
+              <a:t>WebThings</a:t>
+            </a:r>
+            <a:r>
+              <a:rPr lang="en-CA" dirty="0"/>
+              <a:t> - 40m (20m update, 20m discussion)</a:t>
+            </a:r>
+          </a:p>
+          <a:p>
+            <a:pPr lvl="1"/>
+            <a:r>
+              <a:rPr lang="en-CA" dirty="0"/>
+              <a:t>T2TRG - 40m (20m update, 20m discussion)</a:t>
+            </a:r>
+          </a:p>
+          <a:p>
+            <a:r>
+              <a:rPr lang="en-CA" b="1" dirty="0" err="1"/>
+              <a:t>Wrapup</a:t>
+            </a:r>
+            <a:r>
+              <a:rPr lang="en-CA" b="1" dirty="0"/>
+              <a:t> (Sebastian/McCool; 5m)</a:t>
+            </a:r>
+          </a:p>
+          <a:p>
+            <a:endParaRPr lang="en-US" dirty="0"/>
+          </a:p>
+        </p:txBody>
+      </p:sp>
+      <p:sp>
+        <p:nvSpPr>
+          <p:cNvPr id="4" name="Footer Placeholder 3">
+            <a:extLst>
+              <a:ext uri="{FF2B5EF4-FFF2-40B4-BE49-F238E27FC236}">
+                <a16:creationId xmlns:a16="http://schemas.microsoft.com/office/drawing/2014/main" id="{5C2E08F9-3889-484E-ABFE-0CCE8E0DEB72}"/>
+              </a:ext>
+            </a:extLst>
+          </p:cNvPr>
+          <p:cNvSpPr>
+            <a:spLocks noGrp="1"/>
+          </p:cNvSpPr>
+          <p:nvPr>
+            <p:ph type="ftr" sz="quarter" idx="11"/>
+          </p:nvPr>
+        </p:nvSpPr>
+        <p:spPr/>
+        <p:txBody>
+          <a:bodyPr/>
+          <a:lstStyle/>
+          <a:p>
+            <a:r>
+              <a:rPr lang="en-US"/>
+              <a:t>W3C Web of Things (WoT) WG/IG</a:t>
+            </a:r>
+          </a:p>
+        </p:txBody>
+      </p:sp>
+      <p:sp>
+        <p:nvSpPr>
+          <p:cNvPr id="5" name="Slide Number Placeholder 4">
+            <a:extLst>
+              <a:ext uri="{FF2B5EF4-FFF2-40B4-BE49-F238E27FC236}">
+                <a16:creationId xmlns:a16="http://schemas.microsoft.com/office/drawing/2014/main" id="{DC5B4AA3-6A90-5E44-813A-B5C757467D8D}"/>
+              </a:ext>
+            </a:extLst>
+          </p:cNvPr>
+          <p:cNvSpPr>
+            <a:spLocks noGrp="1"/>
+          </p:cNvSpPr>
+          <p:nvPr>
+            <p:ph type="sldNum" sz="quarter" idx="12"/>
+          </p:nvPr>
+        </p:nvSpPr>
+        <p:spPr/>
+        <p:txBody>
+          <a:bodyPr/>
+          <a:lstStyle/>
+          <a:p>
+            <a:fld id="{055BDE2E-7167-1944-9FEE-E44668D91CB6}" type="slidenum">
+              <a:rPr lang="en-US" smtClean="0"/>
+              <a:t>3</a:t>
+            </a:fld>
+            <a:endParaRPr lang="en-US"/>
+          </a:p>
+        </p:txBody>
+      </p:sp>
+      <p:sp>
+        <p:nvSpPr>
+          <p:cNvPr id="6" name="Date Placeholder 5">
+            <a:extLst>
+              <a:ext uri="{FF2B5EF4-FFF2-40B4-BE49-F238E27FC236}">
+                <a16:creationId xmlns:a16="http://schemas.microsoft.com/office/drawing/2014/main" id="{88EF2E26-2E74-6A4E-A6A6-F98317EB849B}"/>
+              </a:ext>
+            </a:extLst>
+          </p:cNvPr>
+          <p:cNvSpPr>
+            <a:spLocks noGrp="1"/>
+          </p:cNvSpPr>
+          <p:nvPr>
+            <p:ph type="dt" sz="half" idx="10"/>
+          </p:nvPr>
+        </p:nvSpPr>
+        <p:spPr/>
+        <p:txBody>
+          <a:bodyPr/>
+          <a:lstStyle/>
+          <a:p>
+            <a:fld id="{B929AB1E-7FD9-0A40-B7C0-508CCACB3E9A}" type="datetime1">
+              <a:rPr lang="en-CA" smtClean="0"/>
+              <a:t>2021-03-09</a:t>
+            </a:fld>
+            <a:endParaRPr lang="en-US"/>
+          </a:p>
+        </p:txBody>
+      </p:sp>
+    </p:spTree>
+    <p:extLst>
+      <p:ext uri="{BB962C8B-B14F-4D97-AF65-F5344CB8AC3E}">
+        <p14:creationId xmlns:p14="http://schemas.microsoft.com/office/powerpoint/2010/main" val="2784170164"/>
+      </p:ext>
+    </p:extLst>
+  </p:cSld>
+  <p:clrMapOvr>
+    <a:masterClrMapping/>
+  </p:clrMapOvr>
+</p:sld>
+</file>
+
+<file path=ppt/slides/slide4.xml><?xml version="1.0" encoding="utf-8"?>
+<p:sld xmlns:a="http://schemas.openxmlformats.org/drawingml/2006/main" xmlns:r="http://schemas.openxmlformats.org/officeDocument/2006/relationships" xmlns:p="http://schemas.openxmlformats.org/presentationml/2006/main">
+  <p:cSld>
+    <p:spTree>
+      <p:nvGrpSpPr>
+        <p:cNvPr id="1" name=""/>
+        <p:cNvGrpSpPr/>
+        <p:nvPr/>
+      </p:nvGrpSpPr>
+      <p:grpSpPr>
+        <a:xfrm>
+          <a:off x="0" y="0"/>
+          <a:ext cx="0" cy="0"/>
+          <a:chOff x="0" y="0"/>
+          <a:chExt cx="0" cy="0"/>
+        </a:xfrm>
+      </p:grpSpPr>
+      <p:sp>
+        <p:nvSpPr>
+          <p:cNvPr id="2" name="Title 1">
+            <a:extLst>
+              <a:ext uri="{FF2B5EF4-FFF2-40B4-BE49-F238E27FC236}">
                 <a16:creationId xmlns:a16="http://schemas.microsoft.com/office/drawing/2014/main" id="{85BC194C-11B4-DF4D-BD5B-07A74B9C6240}"/>
               </a:ext>
             </a:extLst>
@@ -5172,7 +5428,7 @@
           <a:p>
             <a:fld id="{055BDE2E-7167-1944-9FEE-E44668D91CB6}" type="slidenum">
               <a:rPr lang="en-US" smtClean="0"/>
-              <a:t>3</a:t>
+              <a:t>4</a:t>
             </a:fld>
             <a:endParaRPr lang="en-US"/>
           </a:p>

</xml_diff>

<commit_message>
add opening slides for all days
also add per-day agenda summaries for each day
</commit_message>
<xml_diff>
--- a/PRESENTATIONS/2021-03-online-f2f/2021-03-15-WoT-Opening-McCool.pptx
+++ b/PRESENTATIONS/2021-03-online-f2f/2021-03-15-WoT-Opening-McCool.pptx
@@ -4496,23 +4496,19 @@
           <a:p>
             <a:r>
               <a:rPr lang="en-CA" b="1" dirty="0"/>
-              <a:t>IG: Monday March 15 (3h)</a:t>
-            </a:r>
+              <a:t>IG: Monday March 15 (3h) </a:t>
+            </a:r>
+          </a:p>
+          <a:p>
+            <a:pPr lvl="1"/>
+            <a:r>
+              <a:rPr lang="en-CA" b="1" dirty="0"/>
+              <a:t>Joint Sessions </a:t>
+            </a:r>
+          </a:p>
+          <a:p>
             <a:r>
               <a:rPr lang="en-CA" dirty="0"/>
-              <a:t> </a:t>
-            </a:r>
-          </a:p>
-          <a:p>
-            <a:pPr lvl="1"/>
-            <a:r>
-              <a:rPr lang="en-CA" dirty="0"/>
-              <a:t>Joint Sessions </a:t>
-            </a:r>
-          </a:p>
-          <a:p>
-            <a:r>
-              <a:rPr lang="en-CA" b="1" dirty="0"/>
               <a:t>WG: Wednesday March 17 (3h)</a:t>
             </a:r>
           </a:p>
@@ -4525,7 +4521,7 @@
           </a:p>
           <a:p>
             <a:r>
-              <a:rPr lang="en-CA" b="1" dirty="0"/>
+              <a:rPr lang="en-CA" dirty="0"/>
               <a:t>IG: Thursday March 18 (2h)</a:t>
             </a:r>
           </a:p>
@@ -4817,16 +4813,8 @@
           </a:lstStyle>
           <a:p>
             <a:r>
-              <a:rPr lang="en-CA" b="1" dirty="0"/>
-              <a:t>WG: Monday March 22</a:t>
-            </a:r>
-            <a:r>
               <a:rPr lang="en-CA" dirty="0"/>
-              <a:t> </a:t>
-            </a:r>
-            <a:r>
-              <a:rPr lang="en-CA" b="1" dirty="0"/>
-              <a:t>(3h)</a:t>
+              <a:t>WG: Monday March 22 (3h)</a:t>
             </a:r>
           </a:p>
           <a:p>
@@ -4845,7 +4833,7 @@
           </a:p>
           <a:p>
             <a:r>
-              <a:rPr lang="en-CA" b="1" dirty="0"/>
+              <a:rPr lang="en-CA" dirty="0"/>
               <a:t>WG: Wednesday March 24 (3h)</a:t>
             </a:r>
           </a:p>
@@ -4865,7 +4853,7 @@
           </a:p>
           <a:p>
             <a:r>
-              <a:rPr lang="en-CA" b="1" dirty="0"/>
+              <a:rPr lang="en-CA" dirty="0"/>
               <a:t>WG: Thursday March 25 (2h)</a:t>
             </a:r>
           </a:p>

</xml_diff>